<commit_message>
Update utvecklingskostnad till 60 000–100 000 SEK
Justerar initial utvecklingskostnad och timuppskattning (61–95h)
i både markdown-dokument och PowerPoint-presentation.

https://claude.ai/code/session_01RPrbasCgmpZ17g1kUtizxV
</commit_message>
<xml_diff>
--- a/docs/Kostnadsanalys_SEO_MCP_Server.pptx
+++ b/docs/Kostnadsanalys_SEO_MCP_Server.pptx
@@ -3561,7 +3561,7 @@
                         </a:defRPr>
                       </a:pPr>
                       <a:r>
-                        <a:t>80 000 – 150 000</a:t>
+                        <a:t>60 000 – 100 000</a:t>
                       </a:r>
                     </a:p>
                   </a:txBody>
@@ -4951,7 +4951,7 @@
                         </a:defRPr>
                       </a:pPr>
                       <a:r>
-                        <a:t>10 – 15</a:t>
+                        <a:t>8 – 12</a:t>
                       </a:r>
                     </a:p>
                   </a:txBody>
@@ -4972,7 +4972,7 @@
                         </a:defRPr>
                       </a:pPr>
                       <a:r>
-                        <a:t>8 000 – 12 000</a:t>
+                        <a:t>6 400 – 9 600</a:t>
                       </a:r>
                     </a:p>
                   </a:txBody>
@@ -5016,7 +5016,7 @@
                         </a:defRPr>
                       </a:pPr>
                       <a:r>
-                        <a:t>40 – 60</a:t>
+                        <a:t>30 – 45</a:t>
                       </a:r>
                     </a:p>
                   </a:txBody>
@@ -5037,7 +5037,7 @@
                         </a:defRPr>
                       </a:pPr>
                       <a:r>
-                        <a:t>32 000 – 48 000</a:t>
+                        <a:t>24 000 – 36 000</a:t>
                       </a:r>
                     </a:p>
                   </a:txBody>
@@ -5081,7 +5081,7 @@
                         </a:defRPr>
                       </a:pPr>
                       <a:r>
-                        <a:t>15 – 25</a:t>
+                        <a:t>10 – 18</a:t>
                       </a:r>
                     </a:p>
                   </a:txBody>
@@ -5102,7 +5102,7 @@
                         </a:defRPr>
                       </a:pPr>
                       <a:r>
-                        <a:t>12 000 – 20 000</a:t>
+                        <a:t>8 000 – 14 400</a:t>
                       </a:r>
                     </a:p>
                   </a:txBody>
@@ -5146,7 +5146,7 @@
                         </a:defRPr>
                       </a:pPr>
                       <a:r>
-                        <a:t>5 – 10</a:t>
+                        <a:t>5 – 8</a:t>
                       </a:r>
                     </a:p>
                   </a:txBody>
@@ -5167,7 +5167,7 @@
                         </a:defRPr>
                       </a:pPr>
                       <a:r>
-                        <a:t>4 000 – 8 000</a:t>
+                        <a:t>4 000 – 6 400</a:t>
                       </a:r>
                     </a:p>
                   </a:txBody>
@@ -5211,7 +5211,7 @@
                         </a:defRPr>
                       </a:pPr>
                       <a:r>
-                        <a:t>10 – 15</a:t>
+                        <a:t>8 – 12</a:t>
                       </a:r>
                     </a:p>
                   </a:txBody>
@@ -5232,7 +5232,7 @@
                         </a:defRPr>
                       </a:pPr>
                       <a:r>
-                        <a:t>8 000 – 12 000</a:t>
+                        <a:t>6 400 – 9 600</a:t>
                       </a:r>
                     </a:p>
                   </a:txBody>
@@ -5276,7 +5276,7 @@
                         </a:defRPr>
                       </a:pPr>
                       <a:r>
-                        <a:t>80 – 125</a:t>
+                        <a:t>61 – 95</a:t>
                       </a:r>
                     </a:p>
                   </a:txBody>
@@ -5297,7 +5297,7 @@
                         </a:defRPr>
                       </a:pPr>
                       <a:r>
-                        <a:t>64 000 – 100 000</a:t>
+                        <a:t>60 000 – 100 000</a:t>
                       </a:r>
                     </a:p>
                   </a:txBody>
@@ -6169,7 +6169,23 @@
               </a:defRPr>
             </a:pPr>
             <a:r>
-              <a:t>Största kostnaden är utvecklingstid: 80–125 timmar för MVP</a:t>
+              <a:t>Största kostnaden är utvecklingstid: 60–95 timmar för MVP</a:t>
+            </a:r>
+          </a:p>
+          <a:p>
+            <a:pPr>
+              <a:spcAft>
+                <a:spcPts val="800"/>
+              </a:spcAft>
+              <a:defRPr sz="1600">
+                <a:solidFill>
+                  <a:srgbClr val="333333"/>
+                </a:solidFill>
+                <a:latin typeface="Calibri"/>
+              </a:defRPr>
+            </a:pPr>
+            <a:r>
+              <a:t>Total initial utvecklingskostnad: 60 000 – 100 000 SEK</a:t>
             </a:r>
           </a:p>
           <a:p>

</xml_diff>